<commit_message>
Ammonia added as fuel type, updates to figures
</commit_message>
<xml_diff>
--- a/Docs/figures/original_figures/Figures.pptx
+++ b/Docs/figures/original_figures/Figures.pptx
@@ -8,6 +8,7 @@
     <p:sldId id="256" r:id="rId2"/>
     <p:sldId id="257" r:id="rId3"/>
     <p:sldId id="258" r:id="rId4"/>
+    <p:sldId id="260" r:id="rId5"/>
   </p:sldIdLst>
   <p:sldSz cx="12192000" cy="6858000"/>
   <p:notesSz cx="6858000" cy="9144000"/>
@@ -263,7 +264,7 @@
           <a:p>
             <a:fld id="{B07E235D-68CC-4B54-BF2C-7361E13B4EFB}" type="datetimeFigureOut">
               <a:rPr lang="en-GB" smtClean="0"/>
-              <a:t>2021-05-12</a:t>
+              <a:t>2021-11-06</a:t>
             </a:fld>
             <a:endParaRPr lang="en-GB"/>
           </a:p>
@@ -463,7 +464,7 @@
           <a:p>
             <a:fld id="{B07E235D-68CC-4B54-BF2C-7361E13B4EFB}" type="datetimeFigureOut">
               <a:rPr lang="en-GB" smtClean="0"/>
-              <a:t>2021-05-12</a:t>
+              <a:t>2021-11-06</a:t>
             </a:fld>
             <a:endParaRPr lang="en-GB"/>
           </a:p>
@@ -673,7 +674,7 @@
           <a:p>
             <a:fld id="{B07E235D-68CC-4B54-BF2C-7361E13B4EFB}" type="datetimeFigureOut">
               <a:rPr lang="en-GB" smtClean="0"/>
-              <a:t>2021-05-12</a:t>
+              <a:t>2021-11-06</a:t>
             </a:fld>
             <a:endParaRPr lang="en-GB"/>
           </a:p>
@@ -873,7 +874,7 @@
           <a:p>
             <a:fld id="{B07E235D-68CC-4B54-BF2C-7361E13B4EFB}" type="datetimeFigureOut">
               <a:rPr lang="en-GB" smtClean="0"/>
-              <a:t>2021-05-12</a:t>
+              <a:t>2021-11-06</a:t>
             </a:fld>
             <a:endParaRPr lang="en-GB"/>
           </a:p>
@@ -1149,7 +1150,7 @@
           <a:p>
             <a:fld id="{B07E235D-68CC-4B54-BF2C-7361E13B4EFB}" type="datetimeFigureOut">
               <a:rPr lang="en-GB" smtClean="0"/>
-              <a:t>2021-05-12</a:t>
+              <a:t>2021-11-06</a:t>
             </a:fld>
             <a:endParaRPr lang="en-GB"/>
           </a:p>
@@ -1417,7 +1418,7 @@
           <a:p>
             <a:fld id="{B07E235D-68CC-4B54-BF2C-7361E13B4EFB}" type="datetimeFigureOut">
               <a:rPr lang="en-GB" smtClean="0"/>
-              <a:t>2021-05-12</a:t>
+              <a:t>2021-11-06</a:t>
             </a:fld>
             <a:endParaRPr lang="en-GB"/>
           </a:p>
@@ -1832,7 +1833,7 @@
           <a:p>
             <a:fld id="{B07E235D-68CC-4B54-BF2C-7361E13B4EFB}" type="datetimeFigureOut">
               <a:rPr lang="en-GB" smtClean="0"/>
-              <a:t>2021-05-12</a:t>
+              <a:t>2021-11-06</a:t>
             </a:fld>
             <a:endParaRPr lang="en-GB"/>
           </a:p>
@@ -1974,7 +1975,7 @@
           <a:p>
             <a:fld id="{B07E235D-68CC-4B54-BF2C-7361E13B4EFB}" type="datetimeFigureOut">
               <a:rPr lang="en-GB" smtClean="0"/>
-              <a:t>2021-05-12</a:t>
+              <a:t>2021-11-06</a:t>
             </a:fld>
             <a:endParaRPr lang="en-GB"/>
           </a:p>
@@ -2087,7 +2088,7 @@
           <a:p>
             <a:fld id="{B07E235D-68CC-4B54-BF2C-7361E13B4EFB}" type="datetimeFigureOut">
               <a:rPr lang="en-GB" smtClean="0"/>
-              <a:t>2021-05-12</a:t>
+              <a:t>2021-11-06</a:t>
             </a:fld>
             <a:endParaRPr lang="en-GB"/>
           </a:p>
@@ -2400,7 +2401,7 @@
           <a:p>
             <a:fld id="{B07E235D-68CC-4B54-BF2C-7361E13B4EFB}" type="datetimeFigureOut">
               <a:rPr lang="en-GB" smtClean="0"/>
-              <a:t>2021-05-12</a:t>
+              <a:t>2021-11-06</a:t>
             </a:fld>
             <a:endParaRPr lang="en-GB"/>
           </a:p>
@@ -2689,7 +2690,7 @@
           <a:p>
             <a:fld id="{B07E235D-68CC-4B54-BF2C-7361E13B4EFB}" type="datetimeFigureOut">
               <a:rPr lang="en-GB" smtClean="0"/>
-              <a:t>2021-05-12</a:t>
+              <a:t>2021-11-06</a:t>
             </a:fld>
             <a:endParaRPr lang="en-GB"/>
           </a:p>
@@ -2932,7 +2933,7 @@
           <a:p>
             <a:fld id="{B07E235D-68CC-4B54-BF2C-7361E13B4EFB}" type="datetimeFigureOut">
               <a:rPr lang="en-GB" smtClean="0"/>
-              <a:t>2021-05-12</a:t>
+              <a:t>2021-11-06</a:t>
             </a:fld>
             <a:endParaRPr lang="en-GB"/>
           </a:p>
@@ -6297,6 +6298,1472 @@
 </p:sld>
 </file>
 
+<file path=ppt/slides/slide4.xml><?xml version="1.0" encoding="utf-8"?>
+<p:sld xmlns:a="http://schemas.openxmlformats.org/drawingml/2006/main" xmlns:r="http://schemas.openxmlformats.org/officeDocument/2006/relationships" xmlns:p="http://schemas.openxmlformats.org/presentationml/2006/main">
+  <p:cSld>
+    <p:spTree>
+      <p:nvGrpSpPr>
+        <p:cNvPr id="1" name=""/>
+        <p:cNvGrpSpPr/>
+        <p:nvPr/>
+      </p:nvGrpSpPr>
+      <p:grpSpPr>
+        <a:xfrm>
+          <a:off x="0" y="0"/>
+          <a:ext cx="0" cy="0"/>
+          <a:chOff x="0" y="0"/>
+          <a:chExt cx="0" cy="0"/>
+        </a:xfrm>
+      </p:grpSpPr>
+      <p:grpSp>
+        <p:nvGrpSpPr>
+          <p:cNvPr id="13" name="Group 12">
+            <a:extLst>
+              <a:ext uri="{FF2B5EF4-FFF2-40B4-BE49-F238E27FC236}">
+                <a16:creationId xmlns:a16="http://schemas.microsoft.com/office/drawing/2014/main" id="{CEC72DCD-943C-4F3F-9396-83D1301DE750}"/>
+              </a:ext>
+            </a:extLst>
+          </p:cNvPr>
+          <p:cNvGrpSpPr/>
+          <p:nvPr/>
+        </p:nvGrpSpPr>
+        <p:grpSpPr>
+          <a:xfrm>
+            <a:off x="178766" y="23572"/>
+            <a:ext cx="11049003" cy="5942407"/>
+            <a:chOff x="178766" y="23572"/>
+            <a:chExt cx="11049003" cy="5942407"/>
+          </a:xfrm>
+        </p:grpSpPr>
+        <p:grpSp>
+          <p:nvGrpSpPr>
+            <p:cNvPr id="15" name="Group 14">
+              <a:extLst>
+                <a:ext uri="{FF2B5EF4-FFF2-40B4-BE49-F238E27FC236}">
+                  <a16:creationId xmlns:a16="http://schemas.microsoft.com/office/drawing/2014/main" id="{36BF63D6-697D-4D5D-9BA5-1857FD72EAD5}"/>
+                </a:ext>
+              </a:extLst>
+            </p:cNvPr>
+            <p:cNvGrpSpPr/>
+            <p:nvPr/>
+          </p:nvGrpSpPr>
+          <p:grpSpPr>
+            <a:xfrm>
+              <a:off x="178766" y="23572"/>
+              <a:ext cx="11049003" cy="5942407"/>
+              <a:chOff x="178766" y="23572"/>
+              <a:chExt cx="11049003" cy="5942407"/>
+            </a:xfrm>
+          </p:grpSpPr>
+          <p:sp>
+            <p:nvSpPr>
+              <p:cNvPr id="44" name="Rectangle 43">
+                <a:extLst>
+                  <a:ext uri="{FF2B5EF4-FFF2-40B4-BE49-F238E27FC236}">
+                    <a16:creationId xmlns:a16="http://schemas.microsoft.com/office/drawing/2014/main" id="{102CF5F0-9AF1-46FD-8828-97265D3997B9}"/>
+                  </a:ext>
+                </a:extLst>
+              </p:cNvPr>
+              <p:cNvSpPr/>
+              <p:nvPr/>
+            </p:nvSpPr>
+            <p:spPr>
+              <a:xfrm>
+                <a:off x="6130833" y="23572"/>
+                <a:ext cx="5096933" cy="2797021"/>
+              </a:xfrm>
+              <a:prstGeom prst="rect">
+                <a:avLst/>
+              </a:prstGeom>
+              <a:solidFill>
+                <a:schemeClr val="accent6">
+                  <a:alpha val="25098"/>
+                </a:schemeClr>
+              </a:solidFill>
+              <a:ln>
+                <a:solidFill>
+                  <a:schemeClr val="tx1"/>
+                </a:solidFill>
+              </a:ln>
+            </p:spPr>
+            <p:style>
+              <a:lnRef idx="2">
+                <a:schemeClr val="accent1">
+                  <a:shade val="50000"/>
+                </a:schemeClr>
+              </a:lnRef>
+              <a:fillRef idx="1">
+                <a:schemeClr val="accent1"/>
+              </a:fillRef>
+              <a:effectRef idx="0">
+                <a:schemeClr val="accent1"/>
+              </a:effectRef>
+              <a:fontRef idx="minor">
+                <a:schemeClr val="lt1"/>
+              </a:fontRef>
+            </p:style>
+            <p:txBody>
+              <a:bodyPr rtlCol="0" anchor="ctr"/>
+              <a:lstStyle/>
+              <a:p>
+                <a:pPr algn="ctr"/>
+                <a:endParaRPr lang="en-GB" dirty="0"/>
+              </a:p>
+            </p:txBody>
+          </p:sp>
+          <p:sp>
+            <p:nvSpPr>
+              <p:cNvPr id="4" name="Rectangle 3">
+                <a:extLst>
+                  <a:ext uri="{FF2B5EF4-FFF2-40B4-BE49-F238E27FC236}">
+                    <a16:creationId xmlns:a16="http://schemas.microsoft.com/office/drawing/2014/main" id="{7783FDCE-244C-4730-A9C9-CA14A61A4674}"/>
+                  </a:ext>
+                </a:extLst>
+              </p:cNvPr>
+              <p:cNvSpPr/>
+              <p:nvPr/>
+            </p:nvSpPr>
+            <p:spPr>
+              <a:xfrm>
+                <a:off x="178766" y="2298566"/>
+                <a:ext cx="2218267" cy="1227667"/>
+              </a:xfrm>
+              <a:prstGeom prst="rect">
+                <a:avLst/>
+              </a:prstGeom>
+            </p:spPr>
+            <p:style>
+              <a:lnRef idx="2">
+                <a:schemeClr val="dk1"/>
+              </a:lnRef>
+              <a:fillRef idx="1">
+                <a:schemeClr val="lt1"/>
+              </a:fillRef>
+              <a:effectRef idx="0">
+                <a:schemeClr val="dk1"/>
+              </a:effectRef>
+              <a:fontRef idx="minor">
+                <a:schemeClr val="dk1"/>
+              </a:fontRef>
+            </p:style>
+            <p:txBody>
+              <a:bodyPr rtlCol="0" anchor="ctr"/>
+              <a:lstStyle/>
+              <a:p>
+                <a:pPr algn="ctr"/>
+                <a:r>
+                  <a:rPr lang="en-GB" sz="2800" dirty="0"/>
+                  <a:t>ELYZER plant</a:t>
+                </a:r>
+              </a:p>
+            </p:txBody>
+          </p:sp>
+          <p:sp>
+            <p:nvSpPr>
+              <p:cNvPr id="6" name="Rectangle 5">
+                <a:extLst>
+                  <a:ext uri="{FF2B5EF4-FFF2-40B4-BE49-F238E27FC236}">
+                    <a16:creationId xmlns:a16="http://schemas.microsoft.com/office/drawing/2014/main" id="{E86EA3EA-9311-4B88-9FEF-C652EF4ABB58}"/>
+                  </a:ext>
+                </a:extLst>
+              </p:cNvPr>
+              <p:cNvSpPr/>
+              <p:nvPr/>
+            </p:nvSpPr>
+            <p:spPr>
+              <a:xfrm>
+                <a:off x="6477970" y="1334217"/>
+                <a:ext cx="2218267" cy="1227667"/>
+              </a:xfrm>
+              <a:prstGeom prst="rect">
+                <a:avLst/>
+              </a:prstGeom>
+            </p:spPr>
+            <p:style>
+              <a:lnRef idx="2">
+                <a:schemeClr val="dk1"/>
+              </a:lnRef>
+              <a:fillRef idx="1">
+                <a:schemeClr val="lt1"/>
+              </a:fillRef>
+              <a:effectRef idx="0">
+                <a:schemeClr val="dk1"/>
+              </a:effectRef>
+              <a:fontRef idx="minor">
+                <a:schemeClr val="dk1"/>
+              </a:fontRef>
+            </p:style>
+            <p:txBody>
+              <a:bodyPr rtlCol="0" anchor="ctr"/>
+              <a:lstStyle/>
+              <a:p>
+                <a:pPr algn="ctr"/>
+                <a:r>
+                  <a:rPr lang="en-GB" sz="2800" dirty="0"/>
+                  <a:t>Demand</a:t>
+                </a:r>
+              </a:p>
+            </p:txBody>
+          </p:sp>
+          <p:sp>
+            <p:nvSpPr>
+              <p:cNvPr id="8" name="Rectangle 7">
+                <a:extLst>
+                  <a:ext uri="{FF2B5EF4-FFF2-40B4-BE49-F238E27FC236}">
+                    <a16:creationId xmlns:a16="http://schemas.microsoft.com/office/drawing/2014/main" id="{6517AA1B-EBEC-4154-B907-92BA9B26FED6}"/>
+                  </a:ext>
+                </a:extLst>
+              </p:cNvPr>
+              <p:cNvSpPr/>
+              <p:nvPr/>
+            </p:nvSpPr>
+            <p:spPr>
+              <a:xfrm>
+                <a:off x="9703772" y="499160"/>
+                <a:ext cx="144000" cy="2088000"/>
+              </a:xfrm>
+              <a:prstGeom prst="rect">
+                <a:avLst/>
+              </a:prstGeom>
+              <a:solidFill>
+                <a:srgbClr val="00B050"/>
+              </a:solidFill>
+              <a:ln>
+                <a:solidFill>
+                  <a:srgbClr val="00B050"/>
+                </a:solidFill>
+              </a:ln>
+            </p:spPr>
+            <p:style>
+              <a:lnRef idx="2">
+                <a:schemeClr val="accent1">
+                  <a:shade val="50000"/>
+                </a:schemeClr>
+              </a:lnRef>
+              <a:fillRef idx="1">
+                <a:schemeClr val="accent1"/>
+              </a:fillRef>
+              <a:effectRef idx="0">
+                <a:schemeClr val="accent1"/>
+              </a:effectRef>
+              <a:fontRef idx="minor">
+                <a:schemeClr val="lt1"/>
+              </a:fontRef>
+            </p:style>
+            <p:txBody>
+              <a:bodyPr rtlCol="0" anchor="ctr"/>
+              <a:lstStyle/>
+              <a:p>
+                <a:pPr algn="ctr"/>
+                <a:endParaRPr lang="en-GB"/>
+              </a:p>
+            </p:txBody>
+          </p:sp>
+          <p:cxnSp>
+            <p:nvCxnSpPr>
+              <p:cNvPr id="11" name="Connector: Elbow 10">
+                <a:extLst>
+                  <a:ext uri="{FF2B5EF4-FFF2-40B4-BE49-F238E27FC236}">
+                    <a16:creationId xmlns:a16="http://schemas.microsoft.com/office/drawing/2014/main" id="{35B2132B-5CB3-4332-90B8-E69DBA5420D1}"/>
+                  </a:ext>
+                </a:extLst>
+              </p:cNvPr>
+              <p:cNvCxnSpPr>
+                <a:cxnSpLocks/>
+                <a:endCxn id="4" idx="0"/>
+              </p:cNvCxnSpPr>
+              <p:nvPr/>
+            </p:nvCxnSpPr>
+            <p:spPr>
+              <a:xfrm rot="10800000" flipV="1">
+                <a:off x="1287900" y="1062572"/>
+                <a:ext cx="8415872" cy="1235994"/>
+              </a:xfrm>
+              <a:prstGeom prst="bentConnector2">
+                <a:avLst/>
+              </a:prstGeom>
+              <a:ln w="57150">
+                <a:solidFill>
+                  <a:srgbClr val="00B050"/>
+                </a:solidFill>
+                <a:prstDash val="sysDash"/>
+                <a:tailEnd type="triangle"/>
+              </a:ln>
+            </p:spPr>
+            <p:style>
+              <a:lnRef idx="1">
+                <a:schemeClr val="accent1"/>
+              </a:lnRef>
+              <a:fillRef idx="0">
+                <a:schemeClr val="accent1"/>
+              </a:fillRef>
+              <a:effectRef idx="0">
+                <a:schemeClr val="accent1"/>
+              </a:effectRef>
+              <a:fontRef idx="minor">
+                <a:schemeClr val="tx1"/>
+              </a:fontRef>
+            </p:style>
+          </p:cxnSp>
+          <p:cxnSp>
+            <p:nvCxnSpPr>
+              <p:cNvPr id="16" name="Straight Arrow Connector 15">
+                <a:extLst>
+                  <a:ext uri="{FF2B5EF4-FFF2-40B4-BE49-F238E27FC236}">
+                    <a16:creationId xmlns:a16="http://schemas.microsoft.com/office/drawing/2014/main" id="{ACC3B68C-8BCA-4923-A96D-8C7303F9A697}"/>
+                  </a:ext>
+                </a:extLst>
+              </p:cNvPr>
+              <p:cNvCxnSpPr>
+                <a:cxnSpLocks/>
+              </p:cNvCxnSpPr>
+              <p:nvPr/>
+            </p:nvCxnSpPr>
+            <p:spPr>
+              <a:xfrm flipH="1">
+                <a:off x="9854482" y="1179272"/>
+                <a:ext cx="1007534" cy="0"/>
+              </a:xfrm>
+              <a:prstGeom prst="straightConnector1">
+                <a:avLst/>
+              </a:prstGeom>
+              <a:ln w="57150">
+                <a:solidFill>
+                  <a:srgbClr val="00B050"/>
+                </a:solidFill>
+                <a:prstDash val="sysDash"/>
+                <a:tailEnd type="triangle"/>
+              </a:ln>
+            </p:spPr>
+            <p:style>
+              <a:lnRef idx="1">
+                <a:schemeClr val="accent1"/>
+              </a:lnRef>
+              <a:fillRef idx="0">
+                <a:schemeClr val="accent1"/>
+              </a:fillRef>
+              <a:effectRef idx="0">
+                <a:schemeClr val="accent1"/>
+              </a:effectRef>
+              <a:fontRef idx="minor">
+                <a:schemeClr val="tx1"/>
+              </a:fontRef>
+            </p:style>
+          </p:cxnSp>
+          <p:cxnSp>
+            <p:nvCxnSpPr>
+              <p:cNvPr id="17" name="Straight Arrow Connector 16">
+                <a:extLst>
+                  <a:ext uri="{FF2B5EF4-FFF2-40B4-BE49-F238E27FC236}">
+                    <a16:creationId xmlns:a16="http://schemas.microsoft.com/office/drawing/2014/main" id="{A5AA3D52-87C9-49C7-8D8E-E8939048AA9B}"/>
+                  </a:ext>
+                </a:extLst>
+              </p:cNvPr>
+              <p:cNvCxnSpPr>
+                <a:cxnSpLocks/>
+              </p:cNvCxnSpPr>
+              <p:nvPr/>
+            </p:nvCxnSpPr>
+            <p:spPr>
+              <a:xfrm flipH="1">
+                <a:off x="9854482" y="789806"/>
+                <a:ext cx="1007534" cy="0"/>
+              </a:xfrm>
+              <a:prstGeom prst="straightConnector1">
+                <a:avLst/>
+              </a:prstGeom>
+              <a:ln w="57150">
+                <a:solidFill>
+                  <a:srgbClr val="00B050"/>
+                </a:solidFill>
+                <a:prstDash val="sysDash"/>
+                <a:tailEnd type="triangle"/>
+              </a:ln>
+            </p:spPr>
+            <p:style>
+              <a:lnRef idx="1">
+                <a:schemeClr val="accent1"/>
+              </a:lnRef>
+              <a:fillRef idx="0">
+                <a:schemeClr val="accent1"/>
+              </a:fillRef>
+              <a:effectRef idx="0">
+                <a:schemeClr val="accent1"/>
+              </a:effectRef>
+              <a:fontRef idx="minor">
+                <a:schemeClr val="tx1"/>
+              </a:fontRef>
+            </p:style>
+          </p:cxnSp>
+          <p:cxnSp>
+            <p:nvCxnSpPr>
+              <p:cNvPr id="18" name="Straight Arrow Connector 17">
+                <a:extLst>
+                  <a:ext uri="{FF2B5EF4-FFF2-40B4-BE49-F238E27FC236}">
+                    <a16:creationId xmlns:a16="http://schemas.microsoft.com/office/drawing/2014/main" id="{34AA2612-FEFE-4552-B691-A8C8438D41FD}"/>
+                  </a:ext>
+                </a:extLst>
+              </p:cNvPr>
+              <p:cNvCxnSpPr>
+                <a:cxnSpLocks/>
+              </p:cNvCxnSpPr>
+              <p:nvPr/>
+            </p:nvCxnSpPr>
+            <p:spPr>
+              <a:xfrm flipH="1">
+                <a:off x="8696237" y="1948051"/>
+                <a:ext cx="1007535" cy="0"/>
+              </a:xfrm>
+              <a:prstGeom prst="straightConnector1">
+                <a:avLst/>
+              </a:prstGeom>
+              <a:ln w="57150">
+                <a:solidFill>
+                  <a:srgbClr val="00B050"/>
+                </a:solidFill>
+                <a:prstDash val="sysDash"/>
+                <a:tailEnd type="triangle"/>
+              </a:ln>
+            </p:spPr>
+            <p:style>
+              <a:lnRef idx="1">
+                <a:schemeClr val="accent1"/>
+              </a:lnRef>
+              <a:fillRef idx="0">
+                <a:schemeClr val="accent1"/>
+              </a:fillRef>
+              <a:effectRef idx="0">
+                <a:schemeClr val="accent1"/>
+              </a:effectRef>
+              <a:fontRef idx="minor">
+                <a:schemeClr val="tx1"/>
+              </a:fontRef>
+            </p:style>
+          </p:cxnSp>
+          <p:sp>
+            <p:nvSpPr>
+              <p:cNvPr id="36" name="TextBox 35">
+                <a:extLst>
+                  <a:ext uri="{FF2B5EF4-FFF2-40B4-BE49-F238E27FC236}">
+                    <a16:creationId xmlns:a16="http://schemas.microsoft.com/office/drawing/2014/main" id="{FE1F951A-2E1F-4C10-B43C-C0E0D480DAA2}"/>
+                  </a:ext>
+                </a:extLst>
+              </p:cNvPr>
+              <p:cNvSpPr txBox="1"/>
+              <p:nvPr/>
+            </p:nvSpPr>
+            <p:spPr>
+              <a:xfrm>
+                <a:off x="6139540" y="36116"/>
+                <a:ext cx="2386510" cy="523220"/>
+              </a:xfrm>
+              <a:prstGeom prst="rect">
+                <a:avLst/>
+              </a:prstGeom>
+              <a:noFill/>
+            </p:spPr>
+            <p:txBody>
+              <a:bodyPr wrap="square">
+                <a:spAutoFit/>
+              </a:bodyPr>
+              <a:lstStyle/>
+              <a:p>
+                <a:pPr algn="ctr"/>
+                <a:r>
+                  <a:rPr lang="en-GB" sz="2800" i="1" dirty="0"/>
+                  <a:t>Power Zone (n)</a:t>
+                </a:r>
+              </a:p>
+            </p:txBody>
+          </p:sp>
+          <p:sp>
+            <p:nvSpPr>
+              <p:cNvPr id="41" name="TextBox 40">
+                <a:extLst>
+                  <a:ext uri="{FF2B5EF4-FFF2-40B4-BE49-F238E27FC236}">
+                    <a16:creationId xmlns:a16="http://schemas.microsoft.com/office/drawing/2014/main" id="{BD9F991E-003B-4565-9E46-D7D5465EBFF7}"/>
+                  </a:ext>
+                </a:extLst>
+              </p:cNvPr>
+              <p:cNvSpPr txBox="1"/>
+              <p:nvPr/>
+            </p:nvSpPr>
+            <p:spPr>
+              <a:xfrm>
+                <a:off x="1250226" y="1038498"/>
+                <a:ext cx="2171692" cy="954107"/>
+              </a:xfrm>
+              <a:prstGeom prst="rect">
+                <a:avLst/>
+              </a:prstGeom>
+              <a:noFill/>
+            </p:spPr>
+            <p:txBody>
+              <a:bodyPr wrap="square">
+                <a:spAutoFit/>
+              </a:bodyPr>
+              <a:lstStyle/>
+              <a:p>
+                <a:pPr algn="ctr"/>
+                <a:r>
+                  <a:rPr lang="en-GB" sz="2800" i="1" dirty="0"/>
+                  <a:t>Power Consumption</a:t>
+                </a:r>
+              </a:p>
+            </p:txBody>
+          </p:sp>
+          <p:cxnSp>
+            <p:nvCxnSpPr>
+              <p:cNvPr id="31" name="Straight Arrow Connector 30">
+                <a:extLst>
+                  <a:ext uri="{FF2B5EF4-FFF2-40B4-BE49-F238E27FC236}">
+                    <a16:creationId xmlns:a16="http://schemas.microsoft.com/office/drawing/2014/main" id="{DD0EB14C-F8D2-4A2A-B3AD-2E8DA9346478}"/>
+                  </a:ext>
+                </a:extLst>
+              </p:cNvPr>
+              <p:cNvCxnSpPr>
+                <a:cxnSpLocks/>
+              </p:cNvCxnSpPr>
+              <p:nvPr/>
+            </p:nvCxnSpPr>
+            <p:spPr>
+              <a:xfrm flipH="1">
+                <a:off x="9854482" y="1595785"/>
+                <a:ext cx="1007534" cy="0"/>
+              </a:xfrm>
+              <a:prstGeom prst="straightConnector1">
+                <a:avLst/>
+              </a:prstGeom>
+              <a:ln w="57150">
+                <a:solidFill>
+                  <a:srgbClr val="00B050"/>
+                </a:solidFill>
+                <a:prstDash val="sysDash"/>
+                <a:tailEnd type="triangle"/>
+              </a:ln>
+            </p:spPr>
+            <p:style>
+              <a:lnRef idx="1">
+                <a:schemeClr val="accent1"/>
+              </a:lnRef>
+              <a:fillRef idx="0">
+                <a:schemeClr val="accent1"/>
+              </a:fillRef>
+              <a:effectRef idx="0">
+                <a:schemeClr val="accent1"/>
+              </a:effectRef>
+              <a:fontRef idx="minor">
+                <a:schemeClr val="tx1"/>
+              </a:fontRef>
+            </p:style>
+          </p:cxnSp>
+          <p:sp>
+            <p:nvSpPr>
+              <p:cNvPr id="37" name="Rectangle 36">
+                <a:extLst>
+                  <a:ext uri="{FF2B5EF4-FFF2-40B4-BE49-F238E27FC236}">
+                    <a16:creationId xmlns:a16="http://schemas.microsoft.com/office/drawing/2014/main" id="{D39C14E0-C685-4903-AC45-C973A6BB83FE}"/>
+                  </a:ext>
+                </a:extLst>
+              </p:cNvPr>
+              <p:cNvSpPr/>
+              <p:nvPr/>
+            </p:nvSpPr>
+            <p:spPr>
+              <a:xfrm>
+                <a:off x="6130836" y="2902753"/>
+                <a:ext cx="5096933" cy="3063226"/>
+              </a:xfrm>
+              <a:prstGeom prst="rect">
+                <a:avLst/>
+              </a:prstGeom>
+              <a:solidFill>
+                <a:schemeClr val="bg1">
+                  <a:lumMod val="65000"/>
+                  <a:alpha val="25098"/>
+                </a:schemeClr>
+              </a:solidFill>
+              <a:ln>
+                <a:solidFill>
+                  <a:schemeClr val="tx1"/>
+                </a:solidFill>
+              </a:ln>
+            </p:spPr>
+            <p:style>
+              <a:lnRef idx="2">
+                <a:schemeClr val="accent1">
+                  <a:shade val="50000"/>
+                </a:schemeClr>
+              </a:lnRef>
+              <a:fillRef idx="1">
+                <a:schemeClr val="accent1"/>
+              </a:fillRef>
+              <a:effectRef idx="0">
+                <a:schemeClr val="accent1"/>
+              </a:effectRef>
+              <a:fontRef idx="minor">
+                <a:schemeClr val="lt1"/>
+              </a:fontRef>
+            </p:style>
+            <p:txBody>
+              <a:bodyPr rtlCol="0" anchor="ctr"/>
+              <a:lstStyle/>
+              <a:p>
+                <a:pPr algn="ctr"/>
+                <a:endParaRPr lang="en-GB"/>
+              </a:p>
+            </p:txBody>
+          </p:sp>
+          <p:sp>
+            <p:nvSpPr>
+              <p:cNvPr id="38" name="Rectangle: Rounded Corners 37">
+                <a:extLst>
+                  <a:ext uri="{FF2B5EF4-FFF2-40B4-BE49-F238E27FC236}">
+                    <a16:creationId xmlns:a16="http://schemas.microsoft.com/office/drawing/2014/main" id="{7C438502-9D64-4BC3-B993-1BD4CD9F92E8}"/>
+                  </a:ext>
+                </a:extLst>
+              </p:cNvPr>
+              <p:cNvSpPr/>
+              <p:nvPr/>
+            </p:nvSpPr>
+            <p:spPr>
+              <a:xfrm>
+                <a:off x="3035178" y="2305951"/>
+                <a:ext cx="2218267" cy="2810934"/>
+              </a:xfrm>
+              <a:prstGeom prst="roundRect">
+                <a:avLst/>
+              </a:prstGeom>
+              <a:solidFill>
+                <a:schemeClr val="bg2"/>
+              </a:solidFill>
+            </p:spPr>
+            <p:style>
+              <a:lnRef idx="2">
+                <a:schemeClr val="dk1"/>
+              </a:lnRef>
+              <a:fillRef idx="1">
+                <a:schemeClr val="lt1"/>
+              </a:fillRef>
+              <a:effectRef idx="0">
+                <a:schemeClr val="dk1"/>
+              </a:effectRef>
+              <a:fontRef idx="minor">
+                <a:schemeClr val="dk1"/>
+              </a:fontRef>
+            </p:style>
+            <p:txBody>
+              <a:bodyPr rtlCol="0" anchor="ctr"/>
+              <a:lstStyle/>
+              <a:p>
+                <a:pPr algn="ctr"/>
+                <a:r>
+                  <a:rPr lang="en-GB" sz="2800" dirty="0"/>
+                  <a:t>H</a:t>
+                </a:r>
+                <a:r>
+                  <a:rPr lang="en-GB" sz="2800" baseline="-25000" dirty="0"/>
+                  <a:t>2</a:t>
+                </a:r>
+                <a:r>
+                  <a:rPr lang="en-GB" sz="2800" dirty="0"/>
+                  <a:t> Storage</a:t>
+                </a:r>
+              </a:p>
+            </p:txBody>
+          </p:sp>
+          <p:sp>
+            <p:nvSpPr>
+              <p:cNvPr id="39" name="Rectangle 38">
+                <a:extLst>
+                  <a:ext uri="{FF2B5EF4-FFF2-40B4-BE49-F238E27FC236}">
+                    <a16:creationId xmlns:a16="http://schemas.microsoft.com/office/drawing/2014/main" id="{7FDA172C-8DE0-4BDA-B08E-DCC19CDA76D0}"/>
+                  </a:ext>
+                </a:extLst>
+              </p:cNvPr>
+              <p:cNvSpPr/>
+              <p:nvPr/>
+            </p:nvSpPr>
+            <p:spPr>
+              <a:xfrm>
+                <a:off x="8482475" y="3329891"/>
+                <a:ext cx="2218267" cy="1227667"/>
+              </a:xfrm>
+              <a:prstGeom prst="rect">
+                <a:avLst/>
+              </a:prstGeom>
+            </p:spPr>
+            <p:style>
+              <a:lnRef idx="2">
+                <a:schemeClr val="dk1"/>
+              </a:lnRef>
+              <a:fillRef idx="1">
+                <a:schemeClr val="lt1"/>
+              </a:fillRef>
+              <a:effectRef idx="0">
+                <a:schemeClr val="dk1"/>
+              </a:effectRef>
+              <a:fontRef idx="minor">
+                <a:schemeClr val="dk1"/>
+              </a:fontRef>
+            </p:style>
+            <p:txBody>
+              <a:bodyPr rtlCol="0" anchor="ctr"/>
+              <a:lstStyle/>
+              <a:p>
+                <a:pPr algn="ctr"/>
+                <a:r>
+                  <a:rPr lang="en-GB" sz="2800" dirty="0"/>
+                  <a:t>H</a:t>
+                </a:r>
+                <a:r>
+                  <a:rPr lang="en-GB" sz="2800" baseline="-25000" dirty="0"/>
+                  <a:t>2</a:t>
+                </a:r>
+                <a:endParaRPr lang="en-GB" sz="2800" dirty="0"/>
+              </a:p>
+              <a:p>
+                <a:pPr algn="ctr"/>
+                <a:r>
+                  <a:rPr lang="en-GB" sz="2800" dirty="0"/>
+                  <a:t>Demand</a:t>
+                </a:r>
+              </a:p>
+            </p:txBody>
+          </p:sp>
+          <p:sp>
+            <p:nvSpPr>
+              <p:cNvPr id="40" name="Rectangle 39">
+                <a:extLst>
+                  <a:ext uri="{FF2B5EF4-FFF2-40B4-BE49-F238E27FC236}">
+                    <a16:creationId xmlns:a16="http://schemas.microsoft.com/office/drawing/2014/main" id="{AF3B4838-80E5-4ACD-B3A6-4CA1BE48FD15}"/>
+                  </a:ext>
+                </a:extLst>
+              </p:cNvPr>
+              <p:cNvSpPr/>
+              <p:nvPr/>
+            </p:nvSpPr>
+            <p:spPr>
+              <a:xfrm>
+                <a:off x="7265369" y="3396340"/>
+                <a:ext cx="144000" cy="2088000"/>
+              </a:xfrm>
+              <a:prstGeom prst="rect">
+                <a:avLst/>
+              </a:prstGeom>
+              <a:solidFill>
+                <a:schemeClr val="tx1">
+                  <a:lumMod val="50000"/>
+                  <a:lumOff val="50000"/>
+                </a:schemeClr>
+              </a:solidFill>
+              <a:ln>
+                <a:solidFill>
+                  <a:schemeClr val="tx1">
+                    <a:lumMod val="50000"/>
+                    <a:lumOff val="50000"/>
+                  </a:schemeClr>
+                </a:solidFill>
+              </a:ln>
+            </p:spPr>
+            <p:style>
+              <a:lnRef idx="2">
+                <a:schemeClr val="accent1">
+                  <a:shade val="50000"/>
+                </a:schemeClr>
+              </a:lnRef>
+              <a:fillRef idx="1">
+                <a:schemeClr val="accent1"/>
+              </a:fillRef>
+              <a:effectRef idx="0">
+                <a:schemeClr val="accent1"/>
+              </a:effectRef>
+              <a:fontRef idx="minor">
+                <a:schemeClr val="lt1"/>
+              </a:fontRef>
+            </p:style>
+            <p:txBody>
+              <a:bodyPr rtlCol="0" anchor="ctr"/>
+              <a:lstStyle/>
+              <a:p>
+                <a:pPr algn="ctr"/>
+                <a:endParaRPr lang="en-GB"/>
+              </a:p>
+            </p:txBody>
+          </p:sp>
+          <p:cxnSp>
+            <p:nvCxnSpPr>
+              <p:cNvPr id="46" name="Straight Arrow Connector 45">
+                <a:extLst>
+                  <a:ext uri="{FF2B5EF4-FFF2-40B4-BE49-F238E27FC236}">
+                    <a16:creationId xmlns:a16="http://schemas.microsoft.com/office/drawing/2014/main" id="{C5AEFE48-EC17-4EE6-A620-80001C5B46BC}"/>
+                  </a:ext>
+                </a:extLst>
+              </p:cNvPr>
+              <p:cNvCxnSpPr/>
+              <p:nvPr/>
+            </p:nvCxnSpPr>
+            <p:spPr>
+              <a:xfrm>
+                <a:off x="7474941" y="5229877"/>
+                <a:ext cx="1007534" cy="0"/>
+              </a:xfrm>
+              <a:prstGeom prst="straightConnector1">
+                <a:avLst/>
+              </a:prstGeom>
+              <a:ln w="57150">
+                <a:solidFill>
+                  <a:schemeClr val="tx1">
+                    <a:lumMod val="50000"/>
+                    <a:lumOff val="50000"/>
+                  </a:schemeClr>
+                </a:solidFill>
+                <a:prstDash val="sysDash"/>
+                <a:tailEnd type="triangle"/>
+              </a:ln>
+            </p:spPr>
+            <p:style>
+              <a:lnRef idx="1">
+                <a:schemeClr val="accent1"/>
+              </a:lnRef>
+              <a:fillRef idx="0">
+                <a:schemeClr val="accent1"/>
+              </a:fillRef>
+              <a:effectRef idx="0">
+                <a:schemeClr val="accent1"/>
+              </a:effectRef>
+              <a:fontRef idx="minor">
+                <a:schemeClr val="tx1"/>
+              </a:fontRef>
+            </p:style>
+          </p:cxnSp>
+          <p:cxnSp>
+            <p:nvCxnSpPr>
+              <p:cNvPr id="47" name="Straight Arrow Connector 46">
+                <a:extLst>
+                  <a:ext uri="{FF2B5EF4-FFF2-40B4-BE49-F238E27FC236}">
+                    <a16:creationId xmlns:a16="http://schemas.microsoft.com/office/drawing/2014/main" id="{BF345B83-BD2E-4B43-B199-6BD21BC23298}"/>
+                  </a:ext>
+                </a:extLst>
+              </p:cNvPr>
+              <p:cNvCxnSpPr/>
+              <p:nvPr/>
+            </p:nvCxnSpPr>
+            <p:spPr>
+              <a:xfrm>
+                <a:off x="6257835" y="4118909"/>
+                <a:ext cx="1007534" cy="0"/>
+              </a:xfrm>
+              <a:prstGeom prst="straightConnector1">
+                <a:avLst/>
+              </a:prstGeom>
+              <a:ln w="57150">
+                <a:solidFill>
+                  <a:schemeClr val="tx1">
+                    <a:lumMod val="50000"/>
+                    <a:lumOff val="50000"/>
+                  </a:schemeClr>
+                </a:solidFill>
+                <a:prstDash val="sysDash"/>
+                <a:tailEnd type="triangle"/>
+              </a:ln>
+            </p:spPr>
+            <p:style>
+              <a:lnRef idx="1">
+                <a:schemeClr val="accent1"/>
+              </a:lnRef>
+              <a:fillRef idx="0">
+                <a:schemeClr val="accent1"/>
+              </a:fillRef>
+              <a:effectRef idx="0">
+                <a:schemeClr val="accent1"/>
+              </a:effectRef>
+              <a:fontRef idx="minor">
+                <a:schemeClr val="tx1"/>
+              </a:fontRef>
+            </p:style>
+          </p:cxnSp>
+          <p:cxnSp>
+            <p:nvCxnSpPr>
+              <p:cNvPr id="48" name="Straight Arrow Connector 47">
+                <a:extLst>
+                  <a:ext uri="{FF2B5EF4-FFF2-40B4-BE49-F238E27FC236}">
+                    <a16:creationId xmlns:a16="http://schemas.microsoft.com/office/drawing/2014/main" id="{FC9AB5A9-ECFA-410F-961A-56E95A5D3984}"/>
+                  </a:ext>
+                </a:extLst>
+              </p:cNvPr>
+              <p:cNvCxnSpPr/>
+              <p:nvPr/>
+            </p:nvCxnSpPr>
+            <p:spPr>
+              <a:xfrm>
+                <a:off x="6257835" y="4518053"/>
+                <a:ext cx="1007534" cy="0"/>
+              </a:xfrm>
+              <a:prstGeom prst="straightConnector1">
+                <a:avLst/>
+              </a:prstGeom>
+              <a:ln w="57150">
+                <a:solidFill>
+                  <a:schemeClr val="tx1">
+                    <a:lumMod val="50000"/>
+                    <a:lumOff val="50000"/>
+                  </a:schemeClr>
+                </a:solidFill>
+                <a:prstDash val="sysDash"/>
+                <a:tailEnd type="triangle"/>
+              </a:ln>
+            </p:spPr>
+            <p:style>
+              <a:lnRef idx="1">
+                <a:schemeClr val="accent1"/>
+              </a:lnRef>
+              <a:fillRef idx="0">
+                <a:schemeClr val="accent1"/>
+              </a:fillRef>
+              <a:effectRef idx="0">
+                <a:schemeClr val="accent1"/>
+              </a:effectRef>
+              <a:fontRef idx="minor">
+                <a:schemeClr val="tx1"/>
+              </a:fontRef>
+            </p:style>
+          </p:cxnSp>
+          <p:cxnSp>
+            <p:nvCxnSpPr>
+              <p:cNvPr id="50" name="Connector: Elbow 49">
+                <a:extLst>
+                  <a:ext uri="{FF2B5EF4-FFF2-40B4-BE49-F238E27FC236}">
+                    <a16:creationId xmlns:a16="http://schemas.microsoft.com/office/drawing/2014/main" id="{2876F356-5EDC-4CA6-98F0-20C216CD9F92}"/>
+                  </a:ext>
+                </a:extLst>
+              </p:cNvPr>
+              <p:cNvCxnSpPr>
+                <a:cxnSpLocks/>
+              </p:cNvCxnSpPr>
+              <p:nvPr/>
+            </p:nvCxnSpPr>
+            <p:spPr>
+              <a:xfrm flipV="1">
+                <a:off x="3035178" y="4983844"/>
+                <a:ext cx="4230191" cy="835658"/>
+              </a:xfrm>
+              <a:prstGeom prst="bentConnector3">
+                <a:avLst>
+                  <a:gd name="adj1" fmla="val 61940"/>
+                </a:avLst>
+              </a:prstGeom>
+              <a:ln w="57150">
+                <a:solidFill>
+                  <a:schemeClr val="tx1">
+                    <a:lumMod val="50000"/>
+                    <a:lumOff val="50000"/>
+                  </a:schemeClr>
+                </a:solidFill>
+                <a:prstDash val="sysDash"/>
+                <a:tailEnd type="triangle"/>
+              </a:ln>
+            </p:spPr>
+            <p:style>
+              <a:lnRef idx="1">
+                <a:schemeClr val="accent1"/>
+              </a:lnRef>
+              <a:fillRef idx="0">
+                <a:schemeClr val="accent1"/>
+              </a:fillRef>
+              <a:effectRef idx="0">
+                <a:schemeClr val="accent1"/>
+              </a:effectRef>
+              <a:fontRef idx="minor">
+                <a:schemeClr val="tx1"/>
+              </a:fontRef>
+            </p:style>
+          </p:cxnSp>
+          <p:sp>
+            <p:nvSpPr>
+              <p:cNvPr id="51" name="TextBox 50">
+                <a:extLst>
+                  <a:ext uri="{FF2B5EF4-FFF2-40B4-BE49-F238E27FC236}">
+                    <a16:creationId xmlns:a16="http://schemas.microsoft.com/office/drawing/2014/main" id="{9CD38788-38D7-43F1-B604-FCC275B5AAAE}"/>
+                  </a:ext>
+                </a:extLst>
+              </p:cNvPr>
+              <p:cNvSpPr txBox="1"/>
+              <p:nvPr/>
+            </p:nvSpPr>
+            <p:spPr>
+              <a:xfrm>
+                <a:off x="2066835" y="5229877"/>
+                <a:ext cx="3081867" cy="523220"/>
+              </a:xfrm>
+              <a:prstGeom prst="rect">
+                <a:avLst/>
+              </a:prstGeom>
+              <a:noFill/>
+            </p:spPr>
+            <p:txBody>
+              <a:bodyPr wrap="square">
+                <a:spAutoFit/>
+              </a:bodyPr>
+              <a:lstStyle/>
+              <a:p>
+                <a:pPr algn="ctr"/>
+                <a:r>
+                  <a:rPr lang="en-GB" sz="2800" i="1" dirty="0"/>
+                  <a:t>H</a:t>
+                </a:r>
+                <a:r>
+                  <a:rPr lang="en-GB" sz="2800" i="1" baseline="-25000" dirty="0"/>
+                  <a:t>2</a:t>
+                </a:r>
+                <a:r>
+                  <a:rPr lang="en-GB" sz="2800" i="1" dirty="0"/>
+                  <a:t> Slack</a:t>
+                </a:r>
+              </a:p>
+            </p:txBody>
+          </p:sp>
+          <p:sp>
+            <p:nvSpPr>
+              <p:cNvPr id="53" name="TextBox 52">
+                <a:extLst>
+                  <a:ext uri="{FF2B5EF4-FFF2-40B4-BE49-F238E27FC236}">
+                    <a16:creationId xmlns:a16="http://schemas.microsoft.com/office/drawing/2014/main" id="{B52C34E4-46D9-4EEC-9C23-3F2636A8B420}"/>
+                  </a:ext>
+                </a:extLst>
+              </p:cNvPr>
+              <p:cNvSpPr txBox="1"/>
+              <p:nvPr/>
+            </p:nvSpPr>
+            <p:spPr>
+              <a:xfrm>
+                <a:off x="5965357" y="2905055"/>
+                <a:ext cx="2495491" cy="523220"/>
+              </a:xfrm>
+              <a:prstGeom prst="rect">
+                <a:avLst/>
+              </a:prstGeom>
+              <a:noFill/>
+            </p:spPr>
+            <p:txBody>
+              <a:bodyPr wrap="square">
+                <a:spAutoFit/>
+              </a:bodyPr>
+              <a:lstStyle/>
+              <a:p>
+                <a:pPr algn="ctr"/>
+                <a:r>
+                  <a:rPr lang="en-GB" sz="2800" i="1" dirty="0"/>
+                  <a:t>H</a:t>
+                </a:r>
+                <a:r>
+                  <a:rPr lang="en-GB" sz="2800" i="1" baseline="-25000" dirty="0"/>
+                  <a:t>2</a:t>
+                </a:r>
+                <a:r>
+                  <a:rPr lang="en-GB" sz="2800" i="1" dirty="0"/>
+                  <a:t> Zone (nh2)</a:t>
+                </a:r>
+              </a:p>
+            </p:txBody>
+          </p:sp>
+          <p:sp>
+            <p:nvSpPr>
+              <p:cNvPr id="54" name="TextBox 53">
+                <a:extLst>
+                  <a:ext uri="{FF2B5EF4-FFF2-40B4-BE49-F238E27FC236}">
+                    <a16:creationId xmlns:a16="http://schemas.microsoft.com/office/drawing/2014/main" id="{37F8A742-48B0-4C1B-B6E1-211EC663F30F}"/>
+                  </a:ext>
+                </a:extLst>
+              </p:cNvPr>
+              <p:cNvSpPr txBox="1"/>
+              <p:nvPr/>
+            </p:nvSpPr>
+            <p:spPr>
+              <a:xfrm>
+                <a:off x="4852003" y="3184675"/>
+                <a:ext cx="1710272" cy="523220"/>
+              </a:xfrm>
+              <a:prstGeom prst="rect">
+                <a:avLst/>
+              </a:prstGeom>
+              <a:noFill/>
+            </p:spPr>
+            <p:txBody>
+              <a:bodyPr wrap="square">
+                <a:spAutoFit/>
+              </a:bodyPr>
+              <a:lstStyle/>
+              <a:p>
+                <a:pPr algn="ctr"/>
+                <a:r>
+                  <a:rPr lang="en-GB" sz="2800" i="1" dirty="0"/>
+                  <a:t>H</a:t>
+                </a:r>
+                <a:r>
+                  <a:rPr lang="en-GB" sz="2800" i="1" baseline="-25000" dirty="0"/>
+                  <a:t>2</a:t>
+                </a:r>
+                <a:endParaRPr lang="en-GB" sz="2800" i="1" dirty="0"/>
+              </a:p>
+            </p:txBody>
+          </p:sp>
+          <p:cxnSp>
+            <p:nvCxnSpPr>
+              <p:cNvPr id="55" name="Straight Arrow Connector 54">
+                <a:extLst>
+                  <a:ext uri="{FF2B5EF4-FFF2-40B4-BE49-F238E27FC236}">
+                    <a16:creationId xmlns:a16="http://schemas.microsoft.com/office/drawing/2014/main" id="{C6BB75AE-9386-406D-AD92-4556CC4FB3A6}"/>
+                  </a:ext>
+                </a:extLst>
+              </p:cNvPr>
+              <p:cNvCxnSpPr>
+                <a:cxnSpLocks/>
+                <a:stCxn id="38" idx="3"/>
+              </p:cNvCxnSpPr>
+              <p:nvPr/>
+            </p:nvCxnSpPr>
+            <p:spPr>
+              <a:xfrm>
+                <a:off x="5253445" y="3711418"/>
+                <a:ext cx="2011924" cy="0"/>
+              </a:xfrm>
+              <a:prstGeom prst="straightConnector1">
+                <a:avLst/>
+              </a:prstGeom>
+              <a:ln w="57150">
+                <a:solidFill>
+                  <a:schemeClr val="tx1">
+                    <a:lumMod val="50000"/>
+                    <a:lumOff val="50000"/>
+                  </a:schemeClr>
+                </a:solidFill>
+                <a:prstDash val="sysDash"/>
+                <a:tailEnd type="triangle"/>
+              </a:ln>
+            </p:spPr>
+            <p:style>
+              <a:lnRef idx="1">
+                <a:schemeClr val="accent1"/>
+              </a:lnRef>
+              <a:fillRef idx="0">
+                <a:schemeClr val="accent1"/>
+              </a:fillRef>
+              <a:effectRef idx="0">
+                <a:schemeClr val="accent1"/>
+              </a:effectRef>
+              <a:fontRef idx="minor">
+                <a:schemeClr val="tx1"/>
+              </a:fontRef>
+            </p:style>
+          </p:cxnSp>
+        </p:grpSp>
+        <p:sp>
+          <p:nvSpPr>
+            <p:cNvPr id="28" name="Rectangle 27">
+              <a:extLst>
+                <a:ext uri="{FF2B5EF4-FFF2-40B4-BE49-F238E27FC236}">
+                  <a16:creationId xmlns:a16="http://schemas.microsoft.com/office/drawing/2014/main" id="{D1E14465-8DED-47E1-9F89-6BDE3EA48B4C}"/>
+                </a:ext>
+              </a:extLst>
+            </p:cNvPr>
+            <p:cNvSpPr/>
+            <p:nvPr/>
+          </p:nvSpPr>
+          <p:spPr>
+            <a:xfrm>
+              <a:off x="8484563" y="4604567"/>
+              <a:ext cx="2218267" cy="1227667"/>
+            </a:xfrm>
+            <a:prstGeom prst="rect">
+              <a:avLst/>
+            </a:prstGeom>
+          </p:spPr>
+          <p:style>
+            <a:lnRef idx="2">
+              <a:schemeClr val="dk1"/>
+            </a:lnRef>
+            <a:fillRef idx="1">
+              <a:schemeClr val="lt1"/>
+            </a:fillRef>
+            <a:effectRef idx="0">
+              <a:schemeClr val="dk1"/>
+            </a:effectRef>
+            <a:fontRef idx="minor">
+              <a:schemeClr val="dk1"/>
+            </a:fontRef>
+          </p:style>
+          <p:txBody>
+            <a:bodyPr rtlCol="0" anchor="ctr"/>
+            <a:lstStyle/>
+            <a:p>
+              <a:pPr algn="ctr"/>
+              <a:r>
+                <a:rPr lang="en-GB" sz="2800" dirty="0"/>
+                <a:t>P2Liquid</a:t>
+              </a:r>
+            </a:p>
+            <a:p>
+              <a:pPr algn="ctr"/>
+              <a:r>
+                <a:rPr lang="en-GB" sz="2800" dirty="0"/>
+                <a:t>Demand</a:t>
+              </a:r>
+            </a:p>
+          </p:txBody>
+        </p:sp>
+        <p:cxnSp>
+          <p:nvCxnSpPr>
+            <p:cNvPr id="29" name="Straight Arrow Connector 28">
+              <a:extLst>
+                <a:ext uri="{FF2B5EF4-FFF2-40B4-BE49-F238E27FC236}">
+                  <a16:creationId xmlns:a16="http://schemas.microsoft.com/office/drawing/2014/main" id="{0513BB4E-23A2-4FC4-8A71-7F81125EB6F8}"/>
+                </a:ext>
+              </a:extLst>
+            </p:cNvPr>
+            <p:cNvCxnSpPr/>
+            <p:nvPr/>
+          </p:nvCxnSpPr>
+          <p:spPr>
+            <a:xfrm>
+              <a:off x="7474941" y="3943724"/>
+              <a:ext cx="1007534" cy="0"/>
+            </a:xfrm>
+            <a:prstGeom prst="straightConnector1">
+              <a:avLst/>
+            </a:prstGeom>
+            <a:ln w="57150">
+              <a:solidFill>
+                <a:schemeClr val="tx1">
+                  <a:lumMod val="50000"/>
+                  <a:lumOff val="50000"/>
+                </a:schemeClr>
+              </a:solidFill>
+              <a:prstDash val="sysDash"/>
+              <a:tailEnd type="triangle"/>
+            </a:ln>
+          </p:spPr>
+          <p:style>
+            <a:lnRef idx="1">
+              <a:schemeClr val="accent1"/>
+            </a:lnRef>
+            <a:fillRef idx="0">
+              <a:schemeClr val="accent1"/>
+            </a:fillRef>
+            <a:effectRef idx="0">
+              <a:schemeClr val="accent1"/>
+            </a:effectRef>
+            <a:fontRef idx="minor">
+              <a:schemeClr val="tx1"/>
+            </a:fontRef>
+          </p:style>
+        </p:cxnSp>
+        <p:sp>
+          <p:nvSpPr>
+            <p:cNvPr id="30" name="Rectangle 29">
+              <a:extLst>
+                <a:ext uri="{FF2B5EF4-FFF2-40B4-BE49-F238E27FC236}">
+                  <a16:creationId xmlns:a16="http://schemas.microsoft.com/office/drawing/2014/main" id="{7FE31F43-7CF4-42D0-A167-875128B8EF1D}"/>
+                </a:ext>
+              </a:extLst>
+            </p:cNvPr>
+            <p:cNvSpPr/>
+            <p:nvPr/>
+          </p:nvSpPr>
+          <p:spPr>
+            <a:xfrm>
+              <a:off x="178766" y="3642004"/>
+              <a:ext cx="2218267" cy="1227667"/>
+            </a:xfrm>
+            <a:prstGeom prst="rect">
+              <a:avLst/>
+            </a:prstGeom>
+          </p:spPr>
+          <p:style>
+            <a:lnRef idx="2">
+              <a:schemeClr val="dk1"/>
+            </a:lnRef>
+            <a:fillRef idx="1">
+              <a:schemeClr val="lt1"/>
+            </a:fillRef>
+            <a:effectRef idx="0">
+              <a:schemeClr val="dk1"/>
+            </a:effectRef>
+            <a:fontRef idx="minor">
+              <a:schemeClr val="dk1"/>
+            </a:fontRef>
+          </p:style>
+          <p:txBody>
+            <a:bodyPr rtlCol="0" anchor="ctr"/>
+            <a:lstStyle/>
+            <a:p>
+              <a:pPr algn="ctr"/>
+              <a:r>
+                <a:rPr lang="en-GB" sz="2800" dirty="0"/>
+                <a:t>FUEL CELL plant</a:t>
+              </a:r>
+            </a:p>
+          </p:txBody>
+        </p:sp>
+        <p:cxnSp>
+          <p:nvCxnSpPr>
+            <p:cNvPr id="33" name="Straight Arrow Connector 32">
+              <a:extLst>
+                <a:ext uri="{FF2B5EF4-FFF2-40B4-BE49-F238E27FC236}">
+                  <a16:creationId xmlns:a16="http://schemas.microsoft.com/office/drawing/2014/main" id="{291A6D1C-D70B-451D-8AA1-251E7B65B17E}"/>
+                </a:ext>
+              </a:extLst>
+            </p:cNvPr>
+            <p:cNvCxnSpPr>
+              <a:cxnSpLocks/>
+            </p:cNvCxnSpPr>
+            <p:nvPr/>
+          </p:nvCxnSpPr>
+          <p:spPr>
+            <a:xfrm flipH="1">
+              <a:off x="2397033" y="4256222"/>
+              <a:ext cx="563881" cy="0"/>
+            </a:xfrm>
+            <a:prstGeom prst="straightConnector1">
+              <a:avLst/>
+            </a:prstGeom>
+            <a:ln w="57150">
+              <a:solidFill>
+                <a:schemeClr val="tx1">
+                  <a:lumMod val="50000"/>
+                  <a:lumOff val="50000"/>
+                </a:schemeClr>
+              </a:solidFill>
+              <a:prstDash val="sysDash"/>
+              <a:tailEnd type="triangle"/>
+            </a:ln>
+          </p:spPr>
+          <p:style>
+            <a:lnRef idx="1">
+              <a:schemeClr val="accent1"/>
+            </a:lnRef>
+            <a:fillRef idx="0">
+              <a:schemeClr val="accent1"/>
+            </a:fillRef>
+            <a:effectRef idx="0">
+              <a:schemeClr val="accent1"/>
+            </a:effectRef>
+            <a:fontRef idx="minor">
+              <a:schemeClr val="tx1"/>
+            </a:fontRef>
+          </p:style>
+        </p:cxnSp>
+        <p:cxnSp>
+          <p:nvCxnSpPr>
+            <p:cNvPr id="34" name="Straight Arrow Connector 33">
+              <a:extLst>
+                <a:ext uri="{FF2B5EF4-FFF2-40B4-BE49-F238E27FC236}">
+                  <a16:creationId xmlns:a16="http://schemas.microsoft.com/office/drawing/2014/main" id="{168E2B52-DE7B-499C-9E70-DB5CCF304135}"/>
+                </a:ext>
+              </a:extLst>
+            </p:cNvPr>
+            <p:cNvCxnSpPr>
+              <a:cxnSpLocks/>
+            </p:cNvCxnSpPr>
+            <p:nvPr/>
+          </p:nvCxnSpPr>
+          <p:spPr>
+            <a:xfrm>
+              <a:off x="2482602" y="2902753"/>
+              <a:ext cx="552576" cy="0"/>
+            </a:xfrm>
+            <a:prstGeom prst="straightConnector1">
+              <a:avLst/>
+            </a:prstGeom>
+            <a:ln w="57150">
+              <a:solidFill>
+                <a:schemeClr val="tx1">
+                  <a:lumMod val="50000"/>
+                  <a:lumOff val="50000"/>
+                </a:schemeClr>
+              </a:solidFill>
+              <a:prstDash val="sysDash"/>
+              <a:tailEnd type="triangle"/>
+            </a:ln>
+          </p:spPr>
+          <p:style>
+            <a:lnRef idx="1">
+              <a:schemeClr val="accent1"/>
+            </a:lnRef>
+            <a:fillRef idx="0">
+              <a:schemeClr val="accent1"/>
+            </a:fillRef>
+            <a:effectRef idx="0">
+              <a:schemeClr val="accent1"/>
+            </a:effectRef>
+            <a:fontRef idx="minor">
+              <a:schemeClr val="tx1"/>
+            </a:fontRef>
+          </p:style>
+        </p:cxnSp>
+        <p:cxnSp>
+          <p:nvCxnSpPr>
+            <p:cNvPr id="42" name="Connector: Elbow 41">
+              <a:extLst>
+                <a:ext uri="{FF2B5EF4-FFF2-40B4-BE49-F238E27FC236}">
+                  <a16:creationId xmlns:a16="http://schemas.microsoft.com/office/drawing/2014/main" id="{A08B0519-783E-4F3C-8C2A-A1CF43E62E14}"/>
+                </a:ext>
+              </a:extLst>
+            </p:cNvPr>
+            <p:cNvCxnSpPr>
+              <a:cxnSpLocks/>
+              <a:endCxn id="30" idx="1"/>
+            </p:cNvCxnSpPr>
+            <p:nvPr/>
+          </p:nvCxnSpPr>
+          <p:spPr>
+            <a:xfrm rot="10800000" flipV="1">
+              <a:off x="178767" y="764170"/>
+              <a:ext cx="9506171" cy="3491668"/>
+            </a:xfrm>
+            <a:prstGeom prst="bentConnector3">
+              <a:avLst>
+                <a:gd name="adj1" fmla="val 103962"/>
+              </a:avLst>
+            </a:prstGeom>
+            <a:ln w="57150">
+              <a:solidFill>
+                <a:srgbClr val="00B050"/>
+              </a:solidFill>
+              <a:prstDash val="sysDash"/>
+              <a:headEnd type="triangle" w="med" len="med"/>
+              <a:tailEnd type="none" w="med" len="med"/>
+            </a:ln>
+          </p:spPr>
+          <p:style>
+            <a:lnRef idx="1">
+              <a:schemeClr val="accent1"/>
+            </a:lnRef>
+            <a:fillRef idx="0">
+              <a:schemeClr val="accent1"/>
+            </a:fillRef>
+            <a:effectRef idx="0">
+              <a:schemeClr val="accent1"/>
+            </a:effectRef>
+            <a:fontRef idx="minor">
+              <a:schemeClr val="tx1"/>
+            </a:fontRef>
+          </p:style>
+        </p:cxnSp>
+      </p:grpSp>
+    </p:spTree>
+    <p:extLst>
+      <p:ext uri="{BB962C8B-B14F-4D97-AF65-F5344CB8AC3E}">
+        <p14:creationId xmlns:p14="http://schemas.microsoft.com/office/powerpoint/2010/main" val="1955378728"/>
+      </p:ext>
+    </p:extLst>
+  </p:cSld>
+  <p:clrMapOvr>
+    <a:masterClrMapping/>
+  </p:clrMapOvr>
+</p:sld>
+</file>
+
 <file path=ppt/theme/theme1.xml><?xml version="1.0" encoding="utf-8"?>
 <a:theme xmlns:a="http://schemas.openxmlformats.org/drawingml/2006/main" name="Office Theme">
   <a:themeElements>

</xml_diff>